<commit_message>
ppt and phas1 doc added
</commit_message>
<xml_diff>
--- a/PresentationPhase1.pptx
+++ b/PresentationPhase1.pptx
@@ -8,6 +8,9 @@
     <p:sldId id="256" r:id="rId2"/>
     <p:sldId id="257" r:id="rId3"/>
     <p:sldId id="259" r:id="rId4"/>
+    <p:sldId id="260" r:id="rId5"/>
+    <p:sldId id="261" r:id="rId6"/>
+    <p:sldId id="262" r:id="rId7"/>
   </p:sldIdLst>
   <p:sldSz cx="12192000" cy="6858000"/>
   <p:notesSz cx="6858000" cy="9144000"/>
@@ -3021,7 +3024,11 @@
             </a:pPr>
             <a:r>
               <a:rPr lang="en-IN" b="1" dirty="0" smtClean="0"/>
-              <a:t>Objective:</a:t>
+              <a:t>Objective</a:t>
+            </a:r>
+            <a:r>
+              <a:rPr lang="en-IN" b="1" dirty="0" smtClean="0"/>
+              <a:t>:</a:t>
             </a:r>
             <a:r>
               <a:rPr lang="en-IN" dirty="0" smtClean="0"/>
@@ -3143,17 +3150,8 @@
             </a:r>
             <a:r>
               <a:rPr lang="en-IN" sz="2000" dirty="0" smtClean="0"/>
-              <a:t>)Searched </a:t>
-            </a:r>
-            <a:r>
-              <a:rPr lang="en-IN" sz="2000" dirty="0" smtClean="0"/>
-              <a:t>for Online </a:t>
-            </a:r>
-            <a:r>
-              <a:rPr lang="en-IN" sz="2000" dirty="0" smtClean="0"/>
-              <a:t>Dataset </a:t>
-            </a:r>
-            <a:endParaRPr lang="en-IN" sz="2000" dirty="0" smtClean="0"/>
+              <a:t>)Searched for Online Dataset </a:t>
+            </a:r>
           </a:p>
           <a:p>
             <a:r>
@@ -3162,11 +3160,7 @@
             </a:r>
             <a:r>
               <a:rPr lang="en-IN" sz="2000" dirty="0" smtClean="0"/>
-              <a:t>)Data </a:t>
-            </a:r>
-            <a:r>
-              <a:rPr lang="en-IN" sz="2000" dirty="0" smtClean="0"/>
-              <a:t>Pre-processing of the Dataset for Model Training.</a:t>
+              <a:t>)Data Pre-processing of the Dataset for Model Training.</a:t>
             </a:r>
           </a:p>
         </p:txBody>
@@ -3239,7 +3233,12 @@
             <p:ph type="title"/>
           </p:nvPr>
         </p:nvSpPr>
-        <p:spPr/>
+        <p:spPr>
+          <a:xfrm>
+            <a:off x="838200" y="200025"/>
+            <a:ext cx="10515600" cy="1325563"/>
+          </a:xfrm>
+        </p:spPr>
         <p:txBody>
           <a:bodyPr/>
           <a:lstStyle/>
@@ -3279,21 +3278,211 @@
             <p:ph idx="1"/>
           </p:nvPr>
         </p:nvSpPr>
-        <p:spPr/>
-        <p:txBody>
-          <a:bodyPr/>
-          <a:lstStyle/>
-          <a:p>
-            <a:r>
-              <a:rPr lang="en-IN" dirty="0" smtClean="0"/>
-              <a:t>Sen</a:t>
-            </a:r>
-          </a:p>
+        <p:spPr>
+          <a:xfrm>
+            <a:off x="838200" y="1282700"/>
+            <a:ext cx="10515600" cy="5257800"/>
+          </a:xfrm>
+        </p:spPr>
+        <p:txBody>
+          <a:bodyPr>
+            <a:normAutofit fontScale="77500" lnSpcReduction="20000"/>
+          </a:bodyPr>
+          <a:lstStyle/>
           <a:p>
             <a:endParaRPr lang="en-IN" dirty="0"/>
           </a:p>
           <a:p>
-            <a:endParaRPr lang="en-IN" dirty="0"/>
+            <a:r>
+              <a:rPr lang="en-IN" sz="2000" b="1" dirty="0"/>
+              <a:t>A</a:t>
+            </a:r>
+            <a:r>
+              <a:rPr lang="en-IN" sz="2000" b="1" dirty="0" smtClean="0"/>
+              <a:t>n </a:t>
+            </a:r>
+            <a:r>
+              <a:rPr lang="en-IN" sz="2000" b="1" dirty="0"/>
+              <a:t>online </a:t>
+            </a:r>
+            <a:r>
+              <a:rPr lang="en-IN" sz="2000" b="1" dirty="0" smtClean="0"/>
+              <a:t>dataset </a:t>
+            </a:r>
+            <a:r>
+              <a:rPr lang="en-IN" sz="2000" b="1" dirty="0"/>
+              <a:t>was used for the project. The </a:t>
+            </a:r>
+            <a:r>
+              <a:rPr lang="en-IN" sz="2000" b="1" dirty="0" smtClean="0"/>
+              <a:t>dataset </a:t>
+            </a:r>
+            <a:r>
+              <a:rPr lang="en-IN" sz="2000" b="1" dirty="0"/>
+              <a:t>was collected from an </a:t>
+            </a:r>
+            <a:r>
+              <a:rPr lang="en-IN" sz="2000" b="1" dirty="0" smtClean="0"/>
+              <a:t>sensor containing accelerometer tied to the jaw of sheep, with </a:t>
+            </a:r>
+            <a:r>
+              <a:rPr lang="en-IN" sz="2000" b="1" dirty="0"/>
+              <a:t>sampling </a:t>
+            </a:r>
+            <a:r>
+              <a:rPr lang="en-IN" sz="2000" b="1" dirty="0" smtClean="0"/>
+              <a:t>rate of 1Hz which was </a:t>
+            </a:r>
+            <a:r>
+              <a:rPr lang="en-IN" sz="2000" b="1" dirty="0"/>
+              <a:t>already labelled with behavioural labels (standing, sitting, walking and grazing). </a:t>
+            </a:r>
+            <a:r>
+              <a:rPr lang="en-IN" sz="2000" b="1" dirty="0" smtClean="0"/>
+              <a:t>Characteristics of the dataset,</a:t>
+            </a:r>
+          </a:p>
+          <a:p>
+            <a:r>
+              <a:rPr lang="en-IN" sz="2000" b="1" dirty="0"/>
+              <a:t>Link: </a:t>
+            </a:r>
+            <a:r>
+              <a:rPr lang="en-IN" sz="2000" b="1" dirty="0">
+                <a:hlinkClick r:id="rId2"/>
+              </a:rPr>
+              <a:t>https://</a:t>
+            </a:r>
+            <a:r>
+              <a:rPr lang="en-IN" sz="2000" b="1" dirty="0" smtClean="0">
+                <a:hlinkClick r:id="rId2"/>
+              </a:rPr>
+              <a:t>www.kaggle.com/datasets/ianharris/wa-sheep-behaviour-accelerometer-data</a:t>
+            </a:r>
+            <a:endParaRPr lang="en-IN" sz="2000" b="1" dirty="0" smtClean="0"/>
+          </a:p>
+          <a:p>
+            <a:r>
+              <a:rPr lang="en-IN" sz="2000" b="1" dirty="0" smtClean="0"/>
+              <a:t>Breed of Sheep: Australian Merinos sheep</a:t>
+            </a:r>
+          </a:p>
+          <a:p>
+            <a:r>
+              <a:rPr lang="en-US" sz="2000" b="1" dirty="0"/>
+              <a:t>Total time duration: 17.37 hours</a:t>
+            </a:r>
+          </a:p>
+          <a:p>
+            <a:r>
+              <a:rPr lang="en-US" sz="2000" b="1" dirty="0"/>
+              <a:t>Number of Columns: 8</a:t>
+            </a:r>
+          </a:p>
+          <a:p>
+            <a:r>
+              <a:rPr lang="en-US" sz="2000" b="1" dirty="0"/>
+              <a:t>Number of features: 3 (x, y, z)</a:t>
+            </a:r>
+          </a:p>
+          <a:p>
+            <a:r>
+              <a:rPr lang="en-US" sz="2000" b="1" dirty="0"/>
+              <a:t>Number of labels: 4 </a:t>
+            </a:r>
+          </a:p>
+          <a:p>
+            <a:r>
+              <a:rPr lang="en-US" sz="2000" b="1" dirty="0"/>
+              <a:t>Target </a:t>
+            </a:r>
+            <a:r>
+              <a:rPr lang="en-US" sz="2000" b="1" dirty="0" err="1" smtClean="0"/>
+              <a:t>behaviour</a:t>
+            </a:r>
+            <a:r>
+              <a:rPr lang="en-US" sz="2000" b="1" dirty="0" smtClean="0"/>
+              <a:t> </a:t>
+            </a:r>
+            <a:r>
+              <a:rPr lang="en-US" sz="2000" b="1" dirty="0"/>
+              <a:t>labels: </a:t>
+            </a:r>
+            <a:r>
+              <a:rPr lang="en-IN" sz="2000" b="1" dirty="0"/>
+              <a:t>standing, sitting, walking and grazing</a:t>
+            </a:r>
+            <a:endParaRPr lang="en-US" sz="2000" b="1" dirty="0"/>
+          </a:p>
+          <a:p>
+            <a:r>
+              <a:rPr lang="en-US" sz="2000" b="1" dirty="0"/>
+              <a:t>Number of rows: 62540</a:t>
+            </a:r>
+          </a:p>
+          <a:p>
+            <a:r>
+              <a:rPr lang="en-US" sz="2000" b="1" dirty="0"/>
+              <a:t>Number of readings for each </a:t>
+            </a:r>
+            <a:r>
+              <a:rPr lang="en-US" sz="2000" b="1" dirty="0" err="1"/>
+              <a:t>behaviour</a:t>
+            </a:r>
+            <a:r>
+              <a:rPr lang="en-US" sz="2000" b="1" dirty="0"/>
+              <a:t>:</a:t>
+            </a:r>
+          </a:p>
+          <a:p>
+            <a:r>
+              <a:rPr lang="en-US" sz="2000" b="1" dirty="0"/>
+              <a:t>Sitting: 11810</a:t>
+            </a:r>
+          </a:p>
+          <a:p>
+            <a:r>
+              <a:rPr lang="en-US" sz="2000" b="1" dirty="0"/>
+              <a:t>Standing: 44870</a:t>
+            </a:r>
+          </a:p>
+          <a:p>
+            <a:r>
+              <a:rPr lang="en-US" sz="2000" b="1" dirty="0"/>
+              <a:t>Walking: 18130</a:t>
+            </a:r>
+          </a:p>
+          <a:p>
+            <a:r>
+              <a:rPr lang="en-US" sz="2000" b="1" dirty="0"/>
+              <a:t>Grazing: 25490</a:t>
+            </a:r>
+          </a:p>
+          <a:p>
+            <a:r>
+              <a:rPr lang="en-US" sz="2000" b="1" dirty="0"/>
+              <a:t>Number of readings falling in the intersection of </a:t>
+            </a:r>
+            <a:r>
+              <a:rPr lang="en-US" sz="2000" b="1" dirty="0" err="1" smtClean="0"/>
+              <a:t>behaviour</a:t>
+            </a:r>
+            <a:r>
+              <a:rPr lang="en-US" sz="2000" b="1" dirty="0" smtClean="0"/>
+              <a:t>: 28680</a:t>
+            </a:r>
+          </a:p>
+          <a:p>
+            <a:pPr marL="0" indent="0">
+              <a:buNone/>
+            </a:pPr>
+            <a:endParaRPr lang="en-US" sz="2000" b="1" dirty="0" smtClean="0"/>
+          </a:p>
+          <a:p>
+            <a:endParaRPr lang="en-IN" sz="2000" b="1" dirty="0" smtClean="0"/>
+          </a:p>
+          <a:p>
+            <a:endParaRPr lang="en-IN" sz="2000" dirty="0"/>
           </a:p>
         </p:txBody>
       </p:sp>
@@ -3301,6 +3490,418 @@
     <p:extLst>
       <p:ext uri="{BB962C8B-B14F-4D97-AF65-F5344CB8AC3E}">
         <p14:creationId xmlns:p14="http://schemas.microsoft.com/office/powerpoint/2010/main" val="3271136489"/>
+      </p:ext>
+    </p:extLst>
+  </p:cSld>
+  <p:clrMapOvr>
+    <a:masterClrMapping/>
+  </p:clrMapOvr>
+</p:sld>
+</file>
+
+<file path=ppt/slides/slide4.xml><?xml version="1.0" encoding="utf-8"?>
+<p:sld xmlns:a="http://schemas.openxmlformats.org/drawingml/2006/main" xmlns:r="http://schemas.openxmlformats.org/officeDocument/2006/relationships" xmlns:p="http://schemas.openxmlformats.org/presentationml/2006/main">
+  <p:cSld>
+    <p:spTree>
+      <p:nvGrpSpPr>
+        <p:cNvPr id="1" name=""/>
+        <p:cNvGrpSpPr/>
+        <p:nvPr/>
+      </p:nvGrpSpPr>
+      <p:grpSpPr>
+        <a:xfrm>
+          <a:off x="0" y="0"/>
+          <a:ext cx="0" cy="0"/>
+          <a:chOff x="0" y="0"/>
+          <a:chExt cx="0" cy="0"/>
+        </a:xfrm>
+      </p:grpSpPr>
+      <p:sp>
+        <p:nvSpPr>
+          <p:cNvPr id="3" name="Content Placeholder 2"/>
+          <p:cNvSpPr>
+            <a:spLocks noGrp="1"/>
+          </p:cNvSpPr>
+          <p:nvPr>
+            <p:ph idx="1"/>
+          </p:nvPr>
+        </p:nvSpPr>
+        <p:spPr>
+          <a:xfrm>
+            <a:off x="838200" y="609600"/>
+            <a:ext cx="10515600" cy="5567363"/>
+          </a:xfrm>
+        </p:spPr>
+        <p:txBody>
+          <a:bodyPr>
+            <a:normAutofit lnSpcReduction="10000"/>
+          </a:bodyPr>
+          <a:lstStyle/>
+          <a:p>
+            <a:pPr marL="0" indent="0">
+              <a:buNone/>
+            </a:pPr>
+            <a:r>
+              <a:rPr lang="en-IN" dirty="0" smtClean="0"/>
+              <a:t>Dataset Format:</a:t>
+            </a:r>
+          </a:p>
+          <a:p>
+            <a:endParaRPr lang="en-IN" dirty="0" smtClean="0"/>
+          </a:p>
+          <a:p>
+            <a:endParaRPr lang="en-IN" dirty="0"/>
+          </a:p>
+          <a:p>
+            <a:endParaRPr lang="en-IN" dirty="0" smtClean="0"/>
+          </a:p>
+          <a:p>
+            <a:endParaRPr lang="en-IN" dirty="0"/>
+          </a:p>
+          <a:p>
+            <a:endParaRPr lang="en-IN" dirty="0" smtClean="0"/>
+          </a:p>
+          <a:p>
+            <a:endParaRPr lang="en-IN" dirty="0"/>
+          </a:p>
+          <a:p>
+            <a:endParaRPr lang="en-IN" dirty="0" smtClean="0"/>
+          </a:p>
+          <a:p>
+            <a:endParaRPr lang="en-IN" dirty="0"/>
+          </a:p>
+          <a:p>
+            <a:endParaRPr lang="en-IN" dirty="0" smtClean="0"/>
+          </a:p>
+          <a:p>
+            <a:r>
+              <a:rPr lang="en-IN" dirty="0" smtClean="0"/>
+              <a:t>…</a:t>
+            </a:r>
+          </a:p>
+          <a:p>
+            <a:pPr marL="0" indent="0">
+              <a:buNone/>
+            </a:pPr>
+            <a:endParaRPr lang="en-IN" dirty="0"/>
+          </a:p>
+          <a:p>
+            <a:pPr marL="0" indent="0">
+              <a:buNone/>
+            </a:pPr>
+            <a:endParaRPr lang="en-IN" dirty="0"/>
+          </a:p>
+        </p:txBody>
+      </p:sp>
+      <p:pic>
+        <p:nvPicPr>
+          <p:cNvPr id="4" name="Picture 3"/>
+          <p:cNvPicPr>
+            <a:picLocks noChangeAspect="1"/>
+          </p:cNvPicPr>
+          <p:nvPr/>
+        </p:nvPicPr>
+        <p:blipFill>
+          <a:blip r:embed="rId2">
+            <a:extLst>
+              <a:ext uri="{28A0092B-C50C-407E-A947-70E740481C1C}">
+                <a14:useLocalDpi xmlns:a14="http://schemas.microsoft.com/office/drawing/2010/main" val="0"/>
+              </a:ext>
+            </a:extLst>
+          </a:blip>
+          <a:stretch>
+            <a:fillRect/>
+          </a:stretch>
+        </p:blipFill>
+        <p:spPr>
+          <a:xfrm>
+            <a:off x="927100" y="1318366"/>
+            <a:ext cx="10426700" cy="4257570"/>
+          </a:xfrm>
+          <a:prstGeom prst="rect">
+            <a:avLst/>
+          </a:prstGeom>
+        </p:spPr>
+      </p:pic>
+    </p:spTree>
+    <p:extLst>
+      <p:ext uri="{BB962C8B-B14F-4D97-AF65-F5344CB8AC3E}">
+        <p14:creationId xmlns:p14="http://schemas.microsoft.com/office/powerpoint/2010/main" val="971960778"/>
+      </p:ext>
+    </p:extLst>
+  </p:cSld>
+  <p:clrMapOvr>
+    <a:masterClrMapping/>
+  </p:clrMapOvr>
+</p:sld>
+</file>
+
+<file path=ppt/slides/slide5.xml><?xml version="1.0" encoding="utf-8"?>
+<p:sld xmlns:a="http://schemas.openxmlformats.org/drawingml/2006/main" xmlns:r="http://schemas.openxmlformats.org/officeDocument/2006/relationships" xmlns:p="http://schemas.openxmlformats.org/presentationml/2006/main">
+  <p:cSld>
+    <p:spTree>
+      <p:nvGrpSpPr>
+        <p:cNvPr id="1" name=""/>
+        <p:cNvGrpSpPr/>
+        <p:nvPr/>
+      </p:nvGrpSpPr>
+      <p:grpSpPr>
+        <a:xfrm>
+          <a:off x="0" y="0"/>
+          <a:ext cx="0" cy="0"/>
+          <a:chOff x="0" y="0"/>
+          <a:chExt cx="0" cy="0"/>
+        </a:xfrm>
+      </p:grpSpPr>
+      <p:sp>
+        <p:nvSpPr>
+          <p:cNvPr id="8" name="Title 7"/>
+          <p:cNvSpPr>
+            <a:spLocks noGrp="1"/>
+          </p:cNvSpPr>
+          <p:nvPr>
+            <p:ph type="title"/>
+          </p:nvPr>
+        </p:nvSpPr>
+        <p:spPr/>
+        <p:txBody>
+          <a:bodyPr/>
+          <a:lstStyle/>
+          <a:p>
+            <a:r>
+              <a:rPr lang="en-IN" sz="2800" b="1" dirty="0" smtClean="0"/>
+              <a:t>Decoding Sensor Data:</a:t>
+            </a:r>
+            <a:endParaRPr lang="en-IN" sz="2800" b="1" dirty="0"/>
+          </a:p>
+        </p:txBody>
+      </p:sp>
+      <p:pic>
+        <p:nvPicPr>
+          <p:cNvPr id="4" name="Content Placeholder 3"/>
+          <p:cNvPicPr>
+            <a:picLocks noGrp="1" noChangeAspect="1"/>
+          </p:cNvPicPr>
+          <p:nvPr>
+            <p:ph sz="half" idx="1"/>
+          </p:nvPr>
+        </p:nvPicPr>
+        <p:blipFill>
+          <a:blip r:embed="rId2">
+            <a:extLst>
+              <a:ext uri="{28A0092B-C50C-407E-A947-70E740481C1C}">
+                <a14:useLocalDpi xmlns:a14="http://schemas.microsoft.com/office/drawing/2010/main" val="0"/>
+              </a:ext>
+            </a:extLst>
+          </a:blip>
+          <a:stretch>
+            <a:fillRect/>
+          </a:stretch>
+        </p:blipFill>
+        <p:spPr>
+          <a:xfrm>
+            <a:off x="1602020" y="2066925"/>
+            <a:ext cx="2764959" cy="4351338"/>
+          </a:xfrm>
+        </p:spPr>
+      </p:pic>
+      <p:sp>
+        <p:nvSpPr>
+          <p:cNvPr id="9" name="Content Placeholder 8"/>
+          <p:cNvSpPr>
+            <a:spLocks noGrp="1"/>
+          </p:cNvSpPr>
+          <p:nvPr>
+            <p:ph sz="half" idx="2"/>
+          </p:nvPr>
+        </p:nvSpPr>
+        <p:spPr/>
+        <p:txBody>
+          <a:bodyPr>
+            <a:normAutofit/>
+          </a:bodyPr>
+          <a:lstStyle/>
+          <a:p>
+            <a:r>
+              <a:rPr lang="en-IN" sz="2400" dirty="0" smtClean="0"/>
+              <a:t>The livestock sensor data is stored real time in fire base database and downloaded as a CSV file. The data that is received is in a nested dictionary format, similar to JSON. Each timestamp is a key, and its value is another dictionary with attributes like </a:t>
+            </a:r>
+            <a:r>
+              <a:rPr lang="en-IN" sz="2400" i="1" dirty="0" smtClean="0"/>
+              <a:t>'</a:t>
+            </a:r>
+            <a:r>
+              <a:rPr lang="en-IN" sz="2400" i="1" dirty="0" err="1" smtClean="0"/>
+              <a:t>driverId</a:t>
+            </a:r>
+            <a:r>
+              <a:rPr lang="en-IN" sz="2400" i="1" dirty="0" smtClean="0"/>
+              <a:t>'</a:t>
+            </a:r>
+            <a:r>
+              <a:rPr lang="en-IN" sz="2400" dirty="0" smtClean="0"/>
+              <a:t>, </a:t>
+            </a:r>
+            <a:r>
+              <a:rPr lang="en-IN" sz="2400" i="1" dirty="0" smtClean="0"/>
+              <a:t>'</a:t>
+            </a:r>
+            <a:r>
+              <a:rPr lang="en-IN" sz="2400" i="1" dirty="0" err="1" smtClean="0"/>
+              <a:t>lat</a:t>
+            </a:r>
+            <a:r>
+              <a:rPr lang="en-IN" sz="2400" i="1" dirty="0" smtClean="0"/>
+              <a:t>'</a:t>
+            </a:r>
+            <a:r>
+              <a:rPr lang="en-IN" sz="2400" dirty="0" smtClean="0"/>
+              <a:t>, </a:t>
+            </a:r>
+            <a:r>
+              <a:rPr lang="en-IN" sz="2400" i="1" dirty="0" smtClean="0"/>
+              <a:t>'</a:t>
+            </a:r>
+            <a:r>
+              <a:rPr lang="en-IN" sz="2400" i="1" dirty="0" err="1" smtClean="0"/>
+              <a:t>lng</a:t>
+            </a:r>
+            <a:r>
+              <a:rPr lang="en-IN" sz="2400" i="1" dirty="0" smtClean="0"/>
+              <a:t>'</a:t>
+            </a:r>
+            <a:r>
+              <a:rPr lang="en-IN" sz="2400" dirty="0" smtClean="0"/>
+              <a:t>, </a:t>
+            </a:r>
+            <a:r>
+              <a:rPr lang="en-IN" sz="2400" i="1" dirty="0" smtClean="0"/>
+              <a:t>'timestamp'</a:t>
+            </a:r>
+            <a:r>
+              <a:rPr lang="en-IN" sz="2400" dirty="0" smtClean="0"/>
+              <a:t>, </a:t>
+            </a:r>
+            <a:r>
+              <a:rPr lang="en-IN" sz="2400" i="1" dirty="0" smtClean="0"/>
+              <a:t>'x'</a:t>
+            </a:r>
+            <a:r>
+              <a:rPr lang="en-IN" sz="2400" dirty="0" smtClean="0"/>
+              <a:t>,</a:t>
+            </a:r>
+            <a:r>
+              <a:rPr lang="en-IN" sz="2400" i="1" dirty="0" smtClean="0"/>
+              <a:t> 'y'</a:t>
+            </a:r>
+            <a:r>
+              <a:rPr lang="en-IN" sz="2400" dirty="0" smtClean="0"/>
+              <a:t>, and </a:t>
+            </a:r>
+            <a:r>
+              <a:rPr lang="en-IN" sz="2400" i="1" dirty="0" smtClean="0"/>
+              <a:t>'z'</a:t>
+            </a:r>
+            <a:r>
+              <a:rPr lang="en-IN" sz="2400" dirty="0" smtClean="0"/>
+              <a:t>.</a:t>
+            </a:r>
+            <a:endParaRPr lang="en-IN" sz="2400" dirty="0"/>
+          </a:p>
+        </p:txBody>
+      </p:sp>
+    </p:spTree>
+    <p:extLst>
+      <p:ext uri="{BB962C8B-B14F-4D97-AF65-F5344CB8AC3E}">
+        <p14:creationId xmlns:p14="http://schemas.microsoft.com/office/powerpoint/2010/main" val="1179945167"/>
+      </p:ext>
+    </p:extLst>
+  </p:cSld>
+  <p:clrMapOvr>
+    <a:masterClrMapping/>
+  </p:clrMapOvr>
+</p:sld>
+</file>
+
+<file path=ppt/slides/slide6.xml><?xml version="1.0" encoding="utf-8"?>
+<p:sld xmlns:a="http://schemas.openxmlformats.org/drawingml/2006/main" xmlns:r="http://schemas.openxmlformats.org/officeDocument/2006/relationships" xmlns:p="http://schemas.openxmlformats.org/presentationml/2006/main">
+  <p:cSld>
+    <p:spTree>
+      <p:nvGrpSpPr>
+        <p:cNvPr id="1" name=""/>
+        <p:cNvGrpSpPr/>
+        <p:nvPr/>
+      </p:nvGrpSpPr>
+      <p:grpSpPr>
+        <a:xfrm>
+          <a:off x="0" y="0"/>
+          <a:ext cx="0" cy="0"/>
+          <a:chOff x="0" y="0"/>
+          <a:chExt cx="0" cy="0"/>
+        </a:xfrm>
+      </p:grpSpPr>
+      <p:pic>
+        <p:nvPicPr>
+          <p:cNvPr id="5" name="Picture 4"/>
+          <p:cNvPicPr/>
+          <p:nvPr/>
+        </p:nvPicPr>
+        <p:blipFill>
+          <a:blip r:embed="rId2">
+            <a:extLst>
+              <a:ext uri="{28A0092B-C50C-407E-A947-70E740481C1C}">
+                <a14:useLocalDpi xmlns:a14="http://schemas.microsoft.com/office/drawing/2010/main" val="0"/>
+              </a:ext>
+            </a:extLst>
+          </a:blip>
+          <a:stretch>
+            <a:fillRect/>
+          </a:stretch>
+        </p:blipFill>
+        <p:spPr>
+          <a:xfrm>
+            <a:off x="2214244" y="351154"/>
+            <a:ext cx="7602855" cy="2938145"/>
+          </a:xfrm>
+          <a:prstGeom prst="rect">
+            <a:avLst/>
+          </a:prstGeom>
+        </p:spPr>
+      </p:pic>
+      <p:pic>
+        <p:nvPicPr>
+          <p:cNvPr id="7" name="Picture 6"/>
+          <p:cNvPicPr>
+            <a:picLocks noChangeAspect="1"/>
+          </p:cNvPicPr>
+          <p:nvPr/>
+        </p:nvPicPr>
+        <p:blipFill>
+          <a:blip r:embed="rId3">
+            <a:extLst>
+              <a:ext uri="{28A0092B-C50C-407E-A947-70E740481C1C}">
+                <a14:useLocalDpi xmlns:a14="http://schemas.microsoft.com/office/drawing/2010/main" val="0"/>
+              </a:ext>
+            </a:extLst>
+          </a:blip>
+          <a:stretch>
+            <a:fillRect/>
+          </a:stretch>
+        </p:blipFill>
+        <p:spPr>
+          <a:xfrm>
+            <a:off x="2870199" y="3773743"/>
+            <a:ext cx="6061611" cy="2835269"/>
+          </a:xfrm>
+          <a:prstGeom prst="rect">
+            <a:avLst/>
+          </a:prstGeom>
+        </p:spPr>
+      </p:pic>
+    </p:spTree>
+    <p:extLst>
+      <p:ext uri="{BB962C8B-B14F-4D97-AF65-F5344CB8AC3E}">
+        <p14:creationId xmlns:p14="http://schemas.microsoft.com/office/powerpoint/2010/main" val="183966741"/>
       </p:ext>
     </p:extLst>
   </p:cSld>

</xml_diff>